<commit_message>
Site updated: 2021-06-16 19:54:33
</commit_message>
<xml_diff>
--- a/2021/06/13/计算机网络01/图片.pptx
+++ b/2021/06/13/计算机网络01/图片.pptx
@@ -105,6 +105,11 @@
       </a:defRPr>
     </a:lvl9pPr>
   </p:defaultTextStyle>
+  <p:extLst>
+    <p:ext uri="{EFAFB233-063F-42B5-8137-9DF3F51BA10A}">
+      <p15:sldGuideLst xmlns:p15="http://schemas.microsoft.com/office/powerpoint/2012/main"/>
+    </p:ext>
+  </p:extLst>
 </p:presentation>
 </file>
 
@@ -4160,7 +4165,7 @@
         </p:nvSpPr>
         <p:spPr>
           <a:xfrm>
-            <a:off x="893036" y="5074373"/>
+            <a:off x="745869" y="5535539"/>
             <a:ext cx="988291" cy="711200"/>
           </a:xfrm>
           <a:prstGeom prst="rect">
@@ -4209,7 +4214,7 @@
         </p:nvSpPr>
         <p:spPr>
           <a:xfrm>
-            <a:off x="10457840" y="5142561"/>
+            <a:off x="10549031" y="5597813"/>
             <a:ext cx="988291" cy="711200"/>
           </a:xfrm>
           <a:prstGeom prst="rect">
@@ -4240,6 +4245,55 @@
             <a:r>
               <a:rPr lang="zh-CN" altLang="en-US" dirty="0"/>
               <a:t>服务器</a:t>
+            </a:r>
+          </a:p>
+        </p:txBody>
+      </p:sp>
+      <p:sp>
+        <p:nvSpPr>
+          <p:cNvPr id="27" name="矩形 26">
+            <a:extLst>
+              <a:ext uri="{FF2B5EF4-FFF2-40B4-BE49-F238E27FC236}">
+                <a16:creationId xmlns:a16="http://schemas.microsoft.com/office/drawing/2014/main" id="{B7590C98-2DA9-4D4F-8393-5A07B3F3ABF4}"/>
+              </a:ext>
+            </a:extLst>
+          </p:cNvPr>
+          <p:cNvSpPr/>
+          <p:nvPr/>
+        </p:nvSpPr>
+        <p:spPr>
+          <a:xfrm>
+            <a:off x="5647450" y="5517285"/>
+            <a:ext cx="988291" cy="711200"/>
+          </a:xfrm>
+          <a:prstGeom prst="rect">
+            <a:avLst/>
+          </a:prstGeom>
+        </p:spPr>
+        <p:style>
+          <a:lnRef idx="2">
+            <a:schemeClr val="accent1">
+              <a:shade val="50000"/>
+            </a:schemeClr>
+          </a:lnRef>
+          <a:fillRef idx="1">
+            <a:schemeClr val="accent1"/>
+          </a:fillRef>
+          <a:effectRef idx="0">
+            <a:schemeClr val="accent1"/>
+          </a:effectRef>
+          <a:fontRef idx="minor">
+            <a:schemeClr val="lt1"/>
+          </a:fontRef>
+        </p:style>
+        <p:txBody>
+          <a:bodyPr rtlCol="0" anchor="ctr"/>
+          <a:lstStyle/>
+          <a:p>
+            <a:pPr algn="ctr"/>
+            <a:r>
+              <a:rPr lang="zh-CN" altLang="en-US" dirty="0"/>
+              <a:t>路由器</a:t>
             </a:r>
           </a:p>
         </p:txBody>

</xml_diff>